<commit_message>
[ch42] Fix one chart in presentation
</commit_message>
<xml_diff>
--- a/presentation.pptx
+++ b/presentation.pptx
@@ -113,13 +113,18 @@
       </a:defRPr>
     </a:lvl9pPr>
   </p:defaultTextStyle>
+  <p:extLst>
+    <p:ext uri="{EFAFB233-063F-42B5-8137-9DF3F51BA10A}">
+      <p15:sldGuideLst xmlns:p15="http://schemas.microsoft.com/office/powerpoint/2012/main"/>
+    </p:ext>
+  </p:extLst>
 </p:presentation>
 </file>
 
 <file path=ppt/charts/chart1.xml><?xml version="1.0" encoding="utf-8"?>
 <c:chartSpace xmlns:c="http://schemas.openxmlformats.org/drawingml/2006/chart" xmlns:a="http://schemas.openxmlformats.org/drawingml/2006/main" xmlns:r="http://schemas.openxmlformats.org/officeDocument/2006/relationships" xmlns:c16r2="http://schemas.microsoft.com/office/drawing/2015/06/chart">
   <c:date1904 val="0"/>
-  <c:lang val="bg-BG"/>
+  <c:lang val="en-US"/>
   <c:roundedCorners val="0"/>
   <mc:AlternateContent xmlns:mc="http://schemas.openxmlformats.org/markup-compatibility/2006">
     <mc:Choice xmlns:c14="http://schemas.microsoft.com/office/drawing/2007/8/2/chart" Requires="c14">
@@ -130,37 +135,7 @@
     </mc:Fallback>
   </mc:AlternateContent>
   <c:chart>
-    <c:title>
-      <c:overlay val="0"/>
-      <c:spPr>
-        <a:noFill/>
-        <a:ln>
-          <a:noFill/>
-        </a:ln>
-        <a:effectLst/>
-      </c:spPr>
-      <c:txPr>
-        <a:bodyPr rot="0" spcFirstLastPara="1" vertOverflow="ellipsis" vert="horz" wrap="square" anchor="ctr" anchorCtr="1"/>
-        <a:lstStyle/>
-        <a:p>
-          <a:pPr>
-            <a:defRPr sz="1862" b="0" i="0" u="none" strike="noStrike" kern="1200" spc="0" baseline="0">
-              <a:solidFill>
-                <a:schemeClr val="tx1">
-                  <a:lumMod val="65000"/>
-                  <a:lumOff val="35000"/>
-                </a:schemeClr>
-              </a:solidFill>
-              <a:latin typeface="+mn-lt"/>
-              <a:ea typeface="+mn-ea"/>
-              <a:cs typeface="+mn-cs"/>
-            </a:defRPr>
-          </a:pPr>
-          <a:endParaRPr lang="en-US"/>
-        </a:p>
-      </c:txPr>
-    </c:title>
-    <c:autoTitleDeleted val="0"/>
+    <c:autoTitleDeleted val="1"/>
     <c:plotArea>
       <c:layout>
         <c:manualLayout>
@@ -624,7 +599,7 @@
 <file path=ppt/charts/chart2.xml><?xml version="1.0" encoding="utf-8"?>
 <c:chartSpace xmlns:c="http://schemas.openxmlformats.org/drawingml/2006/chart" xmlns:a="http://schemas.openxmlformats.org/drawingml/2006/main" xmlns:r="http://schemas.openxmlformats.org/officeDocument/2006/relationships" xmlns:c16r2="http://schemas.microsoft.com/office/drawing/2015/06/chart">
   <c:date1904 val="0"/>
-  <c:lang val="bg-BG"/>
+  <c:lang val="en-US"/>
   <c:roundedCorners val="0"/>
   <mc:AlternateContent xmlns:mc="http://schemas.openxmlformats.org/markup-compatibility/2006">
     <mc:Choice xmlns:c14="http://schemas.microsoft.com/office/drawing/2007/8/2/chart" Requires="c14">
@@ -1188,7 +1163,7 @@
 <file path=ppt/charts/chart3.xml><?xml version="1.0" encoding="utf-8"?>
 <c:chartSpace xmlns:c="http://schemas.openxmlformats.org/drawingml/2006/chart" xmlns:a="http://schemas.openxmlformats.org/drawingml/2006/main" xmlns:r="http://schemas.openxmlformats.org/officeDocument/2006/relationships" xmlns:c16r2="http://schemas.microsoft.com/office/drawing/2015/06/chart">
   <c:date1904 val="0"/>
-  <c:lang val="bg-BG"/>
+  <c:lang val="en-US"/>
   <c:roundedCorners val="0"/>
   <mc:AlternateContent xmlns:mc="http://schemas.openxmlformats.org/markup-compatibility/2006">
     <mc:Choice xmlns:c14="http://schemas.microsoft.com/office/drawing/2007/8/2/chart" Requires="c14">
@@ -1292,6 +1267,11 @@
               </a:ln>
               <a:effectLst/>
             </c:spPr>
+            <c:extLst>
+              <c:ext xmlns:c16="http://schemas.microsoft.com/office/drawing/2014/chart" uri="{C3380CC4-5D6E-409C-BE32-E72D297353CC}">
+                <c16:uniqueId val="{00000001-6B2C-4FA9-B086-55879AED4477}"/>
+              </c:ext>
+            </c:extLst>
           </c:dPt>
           <c:dPt>
             <c:idx val="1"/>
@@ -1307,6 +1287,11 @@
               </a:ln>
               <a:effectLst/>
             </c:spPr>
+            <c:extLst>
+              <c:ext xmlns:c16="http://schemas.microsoft.com/office/drawing/2014/chart" uri="{C3380CC4-5D6E-409C-BE32-E72D297353CC}">
+                <c16:uniqueId val="{00000003-6B2C-4FA9-B086-55879AED4477}"/>
+              </c:ext>
+            </c:extLst>
           </c:dPt>
           <c:dPt>
             <c:idx val="2"/>
@@ -1322,6 +1307,11 @@
               </a:ln>
               <a:effectLst/>
             </c:spPr>
+            <c:extLst>
+              <c:ext xmlns:c16="http://schemas.microsoft.com/office/drawing/2014/chart" uri="{C3380CC4-5D6E-409C-BE32-E72D297353CC}">
+                <c16:uniqueId val="{00000005-6B2C-4FA9-B086-55879AED4477}"/>
+              </c:ext>
+            </c:extLst>
           </c:dPt>
           <c:cat>
             <c:strRef>
@@ -1451,7 +1441,7 @@
 <file path=ppt/charts/chart4.xml><?xml version="1.0" encoding="utf-8"?>
 <c:chartSpace xmlns:c="http://schemas.openxmlformats.org/drawingml/2006/chart" xmlns:a="http://schemas.openxmlformats.org/drawingml/2006/main" xmlns:r="http://schemas.openxmlformats.org/officeDocument/2006/relationships" xmlns:c16r2="http://schemas.microsoft.com/office/drawing/2015/06/chart">
   <c:date1904 val="0"/>
-  <c:lang val="bg-BG"/>
+  <c:lang val="en-US"/>
   <c:roundedCorners val="0"/>
   <mc:AlternateContent xmlns:mc="http://schemas.openxmlformats.org/markup-compatibility/2006">
     <mc:Choice xmlns:c14="http://schemas.microsoft.com/office/drawing/2007/8/2/chart" Requires="c14">
@@ -4233,7 +4223,7 @@
           <a:p>
             <a:fld id="{D639DC80-A931-4F93-B1C7-D5965913A025}" type="datetimeFigureOut">
               <a:rPr lang="en-US" smtClean="0"/>
-              <a:t>5/10/2022</a:t>
+              <a:t>5/18/2022</a:t>
             </a:fld>
             <a:endParaRPr lang="en-US"/>
           </a:p>
@@ -4444,7 +4434,7 @@
           <a:p>
             <a:fld id="{D639DC80-A931-4F93-B1C7-D5965913A025}" type="datetimeFigureOut">
               <a:rPr lang="en-US" smtClean="0"/>
-              <a:t>5/10/2022</a:t>
+              <a:t>5/18/2022</a:t>
             </a:fld>
             <a:endParaRPr lang="en-US"/>
           </a:p>
@@ -4659,7 +4649,7 @@
           <a:p>
             <a:fld id="{D639DC80-A931-4F93-B1C7-D5965913A025}" type="datetimeFigureOut">
               <a:rPr lang="en-US" smtClean="0"/>
-              <a:t>5/10/2022</a:t>
+              <a:t>5/18/2022</a:t>
             </a:fld>
             <a:endParaRPr lang="en-US"/>
           </a:p>
@@ -4860,7 +4850,7 @@
           <a:p>
             <a:fld id="{D639DC80-A931-4F93-B1C7-D5965913A025}" type="datetimeFigureOut">
               <a:rPr lang="en-US" smtClean="0"/>
-              <a:t>5/10/2022</a:t>
+              <a:t>5/18/2022</a:t>
             </a:fld>
             <a:endParaRPr lang="en-US"/>
           </a:p>
@@ -5139,7 +5129,7 @@
           <a:p>
             <a:fld id="{D639DC80-A931-4F93-B1C7-D5965913A025}" type="datetimeFigureOut">
               <a:rPr lang="en-US" smtClean="0"/>
-              <a:t>5/10/2022</a:t>
+              <a:t>5/18/2022</a:t>
             </a:fld>
             <a:endParaRPr lang="en-US"/>
           </a:p>
@@ -5407,7 +5397,7 @@
           <a:p>
             <a:fld id="{D639DC80-A931-4F93-B1C7-D5965913A025}" type="datetimeFigureOut">
               <a:rPr lang="en-US" smtClean="0"/>
-              <a:t>5/10/2022</a:t>
+              <a:t>5/18/2022</a:t>
             </a:fld>
             <a:endParaRPr lang="en-US"/>
           </a:p>
@@ -5823,7 +5813,7 @@
           <a:p>
             <a:fld id="{D639DC80-A931-4F93-B1C7-D5965913A025}" type="datetimeFigureOut">
               <a:rPr lang="en-US" smtClean="0"/>
-              <a:t>5/10/2022</a:t>
+              <a:t>5/18/2022</a:t>
             </a:fld>
             <a:endParaRPr lang="en-US"/>
           </a:p>
@@ -5972,7 +5962,7 @@
           <a:p>
             <a:fld id="{D639DC80-A931-4F93-B1C7-D5965913A025}" type="datetimeFigureOut">
               <a:rPr lang="en-US" smtClean="0"/>
-              <a:t>5/10/2022</a:t>
+              <a:t>5/18/2022</a:t>
             </a:fld>
             <a:endParaRPr lang="en-US"/>
           </a:p>
@@ -6098,7 +6088,7 @@
           <a:p>
             <a:fld id="{D639DC80-A931-4F93-B1C7-D5965913A025}" type="datetimeFigureOut">
               <a:rPr lang="en-US" smtClean="0"/>
-              <a:t>5/10/2022</a:t>
+              <a:t>5/18/2022</a:t>
             </a:fld>
             <a:endParaRPr lang="en-US"/>
           </a:p>
@@ -6349,7 +6339,7 @@
           <a:p>
             <a:fld id="{D639DC80-A931-4F93-B1C7-D5965913A025}" type="datetimeFigureOut">
               <a:rPr lang="en-US" smtClean="0"/>
-              <a:t>5/10/2022</a:t>
+              <a:t>5/18/2022</a:t>
             </a:fld>
             <a:endParaRPr lang="en-US"/>
           </a:p>
@@ -6794,7 +6784,7 @@
           <a:p>
             <a:fld id="{D639DC80-A931-4F93-B1C7-D5965913A025}" type="datetimeFigureOut">
               <a:rPr lang="en-US" smtClean="0"/>
-              <a:t>5/10/2022</a:t>
+              <a:t>5/18/2022</a:t>
             </a:fld>
             <a:endParaRPr lang="en-US"/>
           </a:p>
@@ -7121,7 +7111,7 @@
           <a:p>
             <a:fld id="{D639DC80-A931-4F93-B1C7-D5965913A025}" type="datetimeFigureOut">
               <a:rPr lang="en-US" smtClean="0"/>
-              <a:t>5/10/2022</a:t>
+              <a:t>5/18/2022</a:t>
             </a:fld>
             <a:endParaRPr lang="en-US"/>
           </a:p>
@@ -8808,15 +8798,6 @@
               </a:srgbClr>
             </a:outerShdw>
           </a:effectLst>
-          <a:extLst>
-            <a:ext uri="{909E8E84-426E-40DD-AFC4-6F175D3DCCD1}">
-              <a14:hiddenFill xmlns:a14="http://schemas.microsoft.com/office/drawing/2010/main">
-                <a:solidFill>
-                  <a:srgbClr val="FFFFFF"/>
-                </a:solidFill>
-              </a14:hiddenFill>
-            </a:ext>
-          </a:extLst>
         </p:spPr>
       </p:pic>
       <p:pic>

</xml_diff>